<commit_message>
Updates branding and master slide
</commit_message>
<xml_diff>
--- a/Presentation/ConnectTD-presentation.pptx
+++ b/Presentation/ConnectTD-presentation.pptx
@@ -116,7 +116,16 @@
       </a:defRPr>
     </a:lvl9pPr>
   </p:defaultTextStyle>
+  <p:extLst>
+    <p:ext uri="{EFAFB233-063F-42B5-8137-9DF3F51BA10A}">
+      <p15:sldGuideLst xmlns:p15="http://schemas.microsoft.com/office/powerpoint/2012/main"/>
+    </p:ext>
+  </p:extLst>
 </p:presentation>
+</file>
+
+<file path=ppt/revisionInfo.xml><?xml version="1.0" encoding="utf-8"?>
+<p1510:revInfo xmlns:a="http://schemas.openxmlformats.org/drawingml/2006/main" xmlns:r="http://schemas.openxmlformats.org/officeDocument/2006/relationships" xmlns:p1510="http://schemas.microsoft.com/office/powerpoint/2015/10/main"/>
 </file>
 
 <file path=ppt/notesMasters/notesMaster1.xml><?xml version="1.0" encoding="utf-8"?>
@@ -1142,31 +1151,36 @@
           </a:p>
         </p:txBody>
       </p:sp>
-      <p:sp>
-        <p:nvSpPr>
-          <p:cNvPr id="5" name="Footer Placeholder 4">
-            <a:extLst>
-              <a:ext uri="{FF2B5EF4-FFF2-40B4-BE49-F238E27FC236}">
-                <a16:creationId xmlns:a16="http://schemas.microsoft.com/office/drawing/2014/main" id="{F4309964-FF99-4961-93AF-F7D9740B8341}"/>
-              </a:ext>
-            </a:extLst>
-          </p:cNvPr>
-          <p:cNvSpPr>
-            <a:spLocks noGrp="1"/>
-          </p:cNvSpPr>
-          <p:nvPr>
-            <p:ph type="ftr" sz="quarter" idx="11"/>
-          </p:nvPr>
-        </p:nvSpPr>
-        <p:spPr/>
-        <p:txBody>
-          <a:bodyPr/>
-          <a:lstStyle/>
-          <a:p>
-            <a:endParaRPr lang="de-DE"/>
-          </a:p>
-        </p:txBody>
-      </p:sp>
+      <p:pic>
+        <p:nvPicPr>
+          <p:cNvPr id="7" name="Picture 6">
+            <a:extLst>
+              <a:ext uri="{FF2B5EF4-FFF2-40B4-BE49-F238E27FC236}">
+                <a16:creationId xmlns:a16="http://schemas.microsoft.com/office/drawing/2014/main" id="{6F1BFDE0-514A-458F-BAA8-1C8537F2FD8C}"/>
+              </a:ext>
+            </a:extLst>
+          </p:cNvPr>
+          <p:cNvPicPr>
+            <a:picLocks noChangeAspect="1"/>
+          </p:cNvPicPr>
+          <p:nvPr userDrawn="1"/>
+        </p:nvPicPr>
+        <p:blipFill>
+          <a:blip r:embed="rId2"/>
+          <a:stretch>
+            <a:fillRect/>
+          </a:stretch>
+        </p:blipFill>
+        <p:spPr>
+          <a:xfrm>
+            <a:off x="2681287" y="6291262"/>
+            <a:ext cx="6829425" cy="495300"/>
+          </a:xfrm>
+          <a:prstGeom prst="rect">
+            <a:avLst/>
+          </a:prstGeom>
+        </p:spPr>
+      </p:pic>
       <p:sp>
         <p:nvSpPr>
           <p:cNvPr id="6" name="Slide Number Placeholder 5">
@@ -1396,6 +1410,36 @@
           </a:p>
         </p:txBody>
       </p:sp>
+      <p:pic>
+        <p:nvPicPr>
+          <p:cNvPr id="7" name="Picture 6">
+            <a:extLst>
+              <a:ext uri="{FF2B5EF4-FFF2-40B4-BE49-F238E27FC236}">
+                <a16:creationId xmlns:a16="http://schemas.microsoft.com/office/drawing/2014/main" id="{480B944C-9EEE-4367-BAB8-929F4D86C45C}"/>
+              </a:ext>
+            </a:extLst>
+          </p:cNvPr>
+          <p:cNvPicPr>
+            <a:picLocks noChangeAspect="1"/>
+          </p:cNvPicPr>
+          <p:nvPr userDrawn="1"/>
+        </p:nvPicPr>
+        <p:blipFill>
+          <a:blip r:embed="rId2"/>
+          <a:stretch>
+            <a:fillRect/>
+          </a:stretch>
+        </p:blipFill>
+        <p:spPr>
+          <a:xfrm>
+            <a:off x="2681287" y="6291262"/>
+            <a:ext cx="6829425" cy="495300"/>
+          </a:xfrm>
+          <a:prstGeom prst="rect">
+            <a:avLst/>
+          </a:prstGeom>
+        </p:spPr>
+      </p:pic>
     </p:spTree>
     <p:extLst>
       <p:ext uri="{BB962C8B-B14F-4D97-AF65-F5344CB8AC3E}">
@@ -1606,6 +1650,36 @@
           </a:p>
         </p:txBody>
       </p:sp>
+      <p:pic>
+        <p:nvPicPr>
+          <p:cNvPr id="7" name="Picture 6">
+            <a:extLst>
+              <a:ext uri="{FF2B5EF4-FFF2-40B4-BE49-F238E27FC236}">
+                <a16:creationId xmlns:a16="http://schemas.microsoft.com/office/drawing/2014/main" id="{25600510-6F0B-45EF-9E75-88929B248DC0}"/>
+              </a:ext>
+            </a:extLst>
+          </p:cNvPr>
+          <p:cNvPicPr>
+            <a:picLocks noChangeAspect="1"/>
+          </p:cNvPicPr>
+          <p:nvPr userDrawn="1"/>
+        </p:nvPicPr>
+        <p:blipFill>
+          <a:blip r:embed="rId2"/>
+          <a:stretch>
+            <a:fillRect/>
+          </a:stretch>
+        </p:blipFill>
+        <p:spPr>
+          <a:xfrm>
+            <a:off x="2681287" y="6291262"/>
+            <a:ext cx="6829425" cy="495300"/>
+          </a:xfrm>
+          <a:prstGeom prst="rect">
+            <a:avLst/>
+          </a:prstGeom>
+        </p:spPr>
+      </p:pic>
     </p:spTree>
     <p:extLst>
       <p:ext uri="{BB962C8B-B14F-4D97-AF65-F5344CB8AC3E}">
@@ -1806,6 +1880,36 @@
           </a:p>
         </p:txBody>
       </p:sp>
+      <p:pic>
+        <p:nvPicPr>
+          <p:cNvPr id="7" name="Picture 6">
+            <a:extLst>
+              <a:ext uri="{FF2B5EF4-FFF2-40B4-BE49-F238E27FC236}">
+                <a16:creationId xmlns:a16="http://schemas.microsoft.com/office/drawing/2014/main" id="{C8C005E5-A477-485B-A0AB-AD406D0722B9}"/>
+              </a:ext>
+            </a:extLst>
+          </p:cNvPr>
+          <p:cNvPicPr>
+            <a:picLocks noChangeAspect="1"/>
+          </p:cNvPicPr>
+          <p:nvPr userDrawn="1"/>
+        </p:nvPicPr>
+        <p:blipFill>
+          <a:blip r:embed="rId2"/>
+          <a:stretch>
+            <a:fillRect/>
+          </a:stretch>
+        </p:blipFill>
+        <p:spPr>
+          <a:xfrm>
+            <a:off x="2681287" y="6291262"/>
+            <a:ext cx="6829425" cy="495300"/>
+          </a:xfrm>
+          <a:prstGeom prst="rect">
+            <a:avLst/>
+          </a:prstGeom>
+        </p:spPr>
+      </p:pic>
     </p:spTree>
     <p:extLst>
       <p:ext uri="{BB962C8B-B14F-4D97-AF65-F5344CB8AC3E}">
@@ -2082,6 +2186,36 @@
           </a:p>
         </p:txBody>
       </p:sp>
+      <p:pic>
+        <p:nvPicPr>
+          <p:cNvPr id="7" name="Picture 6">
+            <a:extLst>
+              <a:ext uri="{FF2B5EF4-FFF2-40B4-BE49-F238E27FC236}">
+                <a16:creationId xmlns:a16="http://schemas.microsoft.com/office/drawing/2014/main" id="{C48A8BFC-A2E6-4AA5-B5B2-6646C0361C92}"/>
+              </a:ext>
+            </a:extLst>
+          </p:cNvPr>
+          <p:cNvPicPr>
+            <a:picLocks noChangeAspect="1"/>
+          </p:cNvPicPr>
+          <p:nvPr userDrawn="1"/>
+        </p:nvPicPr>
+        <p:blipFill>
+          <a:blip r:embed="rId2"/>
+          <a:stretch>
+            <a:fillRect/>
+          </a:stretch>
+        </p:blipFill>
+        <p:spPr>
+          <a:xfrm>
+            <a:off x="2681287" y="6291262"/>
+            <a:ext cx="6829425" cy="495300"/>
+          </a:xfrm>
+          <a:prstGeom prst="rect">
+            <a:avLst/>
+          </a:prstGeom>
+        </p:spPr>
+      </p:pic>
     </p:spTree>
     <p:extLst>
       <p:ext uri="{BB962C8B-B14F-4D97-AF65-F5344CB8AC3E}">
@@ -2350,6 +2484,36 @@
           </a:p>
         </p:txBody>
       </p:sp>
+      <p:pic>
+        <p:nvPicPr>
+          <p:cNvPr id="8" name="Picture 7">
+            <a:extLst>
+              <a:ext uri="{FF2B5EF4-FFF2-40B4-BE49-F238E27FC236}">
+                <a16:creationId xmlns:a16="http://schemas.microsoft.com/office/drawing/2014/main" id="{2EFDCBD9-7764-4C91-8AA0-DAC93B79596F}"/>
+              </a:ext>
+            </a:extLst>
+          </p:cNvPr>
+          <p:cNvPicPr>
+            <a:picLocks noChangeAspect="1"/>
+          </p:cNvPicPr>
+          <p:nvPr userDrawn="1"/>
+        </p:nvPicPr>
+        <p:blipFill>
+          <a:blip r:embed="rId2"/>
+          <a:stretch>
+            <a:fillRect/>
+          </a:stretch>
+        </p:blipFill>
+        <p:spPr>
+          <a:xfrm>
+            <a:off x="2681287" y="6291262"/>
+            <a:ext cx="6829425" cy="495300"/>
+          </a:xfrm>
+          <a:prstGeom prst="rect">
+            <a:avLst/>
+          </a:prstGeom>
+        </p:spPr>
+      </p:pic>
     </p:spTree>
     <p:extLst>
       <p:ext uri="{BB962C8B-B14F-4D97-AF65-F5344CB8AC3E}">
@@ -2765,6 +2929,36 @@
           </a:p>
         </p:txBody>
       </p:sp>
+      <p:pic>
+        <p:nvPicPr>
+          <p:cNvPr id="10" name="Picture 9">
+            <a:extLst>
+              <a:ext uri="{FF2B5EF4-FFF2-40B4-BE49-F238E27FC236}">
+                <a16:creationId xmlns:a16="http://schemas.microsoft.com/office/drawing/2014/main" id="{D5AC1AFB-B845-4418-8A17-F48B6687F1E4}"/>
+              </a:ext>
+            </a:extLst>
+          </p:cNvPr>
+          <p:cNvPicPr>
+            <a:picLocks noChangeAspect="1"/>
+          </p:cNvPicPr>
+          <p:nvPr userDrawn="1"/>
+        </p:nvPicPr>
+        <p:blipFill>
+          <a:blip r:embed="rId2"/>
+          <a:stretch>
+            <a:fillRect/>
+          </a:stretch>
+        </p:blipFill>
+        <p:spPr>
+          <a:xfrm>
+            <a:off x="2681287" y="6291262"/>
+            <a:ext cx="6829425" cy="495300"/>
+          </a:xfrm>
+          <a:prstGeom prst="rect">
+            <a:avLst/>
+          </a:prstGeom>
+        </p:spPr>
+      </p:pic>
     </p:spTree>
     <p:extLst>
       <p:ext uri="{BB962C8B-B14F-4D97-AF65-F5344CB8AC3E}">
@@ -2907,6 +3101,36 @@
           </a:p>
         </p:txBody>
       </p:sp>
+      <p:pic>
+        <p:nvPicPr>
+          <p:cNvPr id="6" name="Picture 5">
+            <a:extLst>
+              <a:ext uri="{FF2B5EF4-FFF2-40B4-BE49-F238E27FC236}">
+                <a16:creationId xmlns:a16="http://schemas.microsoft.com/office/drawing/2014/main" id="{F0057552-EA06-4B1C-AFE9-78D26221C06C}"/>
+              </a:ext>
+            </a:extLst>
+          </p:cNvPr>
+          <p:cNvPicPr>
+            <a:picLocks noChangeAspect="1"/>
+          </p:cNvPicPr>
+          <p:nvPr userDrawn="1"/>
+        </p:nvPicPr>
+        <p:blipFill>
+          <a:blip r:embed="rId2"/>
+          <a:stretch>
+            <a:fillRect/>
+          </a:stretch>
+        </p:blipFill>
+        <p:spPr>
+          <a:xfrm>
+            <a:off x="2681287" y="6291262"/>
+            <a:ext cx="6829425" cy="495300"/>
+          </a:xfrm>
+          <a:prstGeom prst="rect">
+            <a:avLst/>
+          </a:prstGeom>
+        </p:spPr>
+      </p:pic>
     </p:spTree>
     <p:extLst>
       <p:ext uri="{BB962C8B-B14F-4D97-AF65-F5344CB8AC3E}">
@@ -3020,6 +3244,36 @@
           </a:p>
         </p:txBody>
       </p:sp>
+      <p:pic>
+        <p:nvPicPr>
+          <p:cNvPr id="5" name="Picture 4">
+            <a:extLst>
+              <a:ext uri="{FF2B5EF4-FFF2-40B4-BE49-F238E27FC236}">
+                <a16:creationId xmlns:a16="http://schemas.microsoft.com/office/drawing/2014/main" id="{868B927B-3A7E-46E5-8F3F-D5625125D935}"/>
+              </a:ext>
+            </a:extLst>
+          </p:cNvPr>
+          <p:cNvPicPr>
+            <a:picLocks noChangeAspect="1"/>
+          </p:cNvPicPr>
+          <p:nvPr userDrawn="1"/>
+        </p:nvPicPr>
+        <p:blipFill>
+          <a:blip r:embed="rId2"/>
+          <a:stretch>
+            <a:fillRect/>
+          </a:stretch>
+        </p:blipFill>
+        <p:spPr>
+          <a:xfrm>
+            <a:off x="2681287" y="6291262"/>
+            <a:ext cx="6829425" cy="495300"/>
+          </a:xfrm>
+          <a:prstGeom prst="rect">
+            <a:avLst/>
+          </a:prstGeom>
+        </p:spPr>
+      </p:pic>
     </p:spTree>
     <p:extLst>
       <p:ext uri="{BB962C8B-B14F-4D97-AF65-F5344CB8AC3E}">
@@ -3333,6 +3587,36 @@
           </a:p>
         </p:txBody>
       </p:sp>
+      <p:pic>
+        <p:nvPicPr>
+          <p:cNvPr id="8" name="Picture 7">
+            <a:extLst>
+              <a:ext uri="{FF2B5EF4-FFF2-40B4-BE49-F238E27FC236}">
+                <a16:creationId xmlns:a16="http://schemas.microsoft.com/office/drawing/2014/main" id="{E7960A70-A16A-40E5-9521-ECFBB96ABCE4}"/>
+              </a:ext>
+            </a:extLst>
+          </p:cNvPr>
+          <p:cNvPicPr>
+            <a:picLocks noChangeAspect="1"/>
+          </p:cNvPicPr>
+          <p:nvPr userDrawn="1"/>
+        </p:nvPicPr>
+        <p:blipFill>
+          <a:blip r:embed="rId2"/>
+          <a:stretch>
+            <a:fillRect/>
+          </a:stretch>
+        </p:blipFill>
+        <p:spPr>
+          <a:xfrm>
+            <a:off x="2681287" y="6291262"/>
+            <a:ext cx="6829425" cy="495300"/>
+          </a:xfrm>
+          <a:prstGeom prst="rect">
+            <a:avLst/>
+          </a:prstGeom>
+        </p:spPr>
+      </p:pic>
     </p:spTree>
     <p:extLst>
       <p:ext uri="{BB962C8B-B14F-4D97-AF65-F5344CB8AC3E}">
@@ -3622,6 +3906,36 @@
           </a:p>
         </p:txBody>
       </p:sp>
+      <p:pic>
+        <p:nvPicPr>
+          <p:cNvPr id="8" name="Picture 7">
+            <a:extLst>
+              <a:ext uri="{FF2B5EF4-FFF2-40B4-BE49-F238E27FC236}">
+                <a16:creationId xmlns:a16="http://schemas.microsoft.com/office/drawing/2014/main" id="{ED1DB974-B722-49AD-93EF-4D3227B9E66F}"/>
+              </a:ext>
+            </a:extLst>
+          </p:cNvPr>
+          <p:cNvPicPr>
+            <a:picLocks noChangeAspect="1"/>
+          </p:cNvPicPr>
+          <p:nvPr userDrawn="1"/>
+        </p:nvPicPr>
+        <p:blipFill>
+          <a:blip r:embed="rId2"/>
+          <a:stretch>
+            <a:fillRect/>
+          </a:stretch>
+        </p:blipFill>
+        <p:spPr>
+          <a:xfrm>
+            <a:off x="2681287" y="6291262"/>
+            <a:ext cx="6829425" cy="495300"/>
+          </a:xfrm>
+          <a:prstGeom prst="rect">
+            <a:avLst/>
+          </a:prstGeom>
+        </p:spPr>
+      </p:pic>
     </p:spTree>
     <p:extLst>
       <p:ext uri="{BB962C8B-B14F-4D97-AF65-F5344CB8AC3E}">
@@ -3689,10 +4003,10 @@
           <a:lstStyle/>
           <a:p>
             <a:r>
-              <a:rPr lang="en-US"/>
+              <a:rPr lang="en-US" dirty="0"/>
               <a:t>Click to edit Master title style</a:t>
             </a:r>
-            <a:endParaRPr lang="de-DE"/>
+            <a:endParaRPr lang="de-DE" dirty="0"/>
           </a:p>
         </p:txBody>
       </p:sp>
@@ -3729,38 +4043,38 @@
           <a:p>
             <a:pPr lvl="0"/>
             <a:r>
-              <a:rPr lang="en-US"/>
+              <a:rPr lang="en-US" dirty="0"/>
               <a:t>Edit Master text styles</a:t>
             </a:r>
           </a:p>
           <a:p>
             <a:pPr lvl="1"/>
             <a:r>
-              <a:rPr lang="en-US"/>
+              <a:rPr lang="en-US" dirty="0"/>
               <a:t>Second level</a:t>
             </a:r>
           </a:p>
           <a:p>
             <a:pPr lvl="2"/>
             <a:r>
-              <a:rPr lang="en-US"/>
+              <a:rPr lang="en-US" dirty="0"/>
               <a:t>Third level</a:t>
             </a:r>
           </a:p>
           <a:p>
             <a:pPr lvl="3"/>
             <a:r>
-              <a:rPr lang="en-US"/>
+              <a:rPr lang="en-US" dirty="0"/>
               <a:t>Fourth level</a:t>
             </a:r>
           </a:p>
           <a:p>
             <a:pPr lvl="4"/>
             <a:r>
-              <a:rPr lang="en-US"/>
+              <a:rPr lang="en-US" dirty="0"/>
               <a:t>Fifth level</a:t>
             </a:r>
-            <a:endParaRPr lang="de-DE"/>
+            <a:endParaRPr lang="de-DE" dirty="0"/>
           </a:p>
         </p:txBody>
       </p:sp>
@@ -3901,6 +4215,36 @@
           </a:p>
         </p:txBody>
       </p:sp>
+      <p:pic>
+        <p:nvPicPr>
+          <p:cNvPr id="7" name="Picture 6">
+            <a:extLst>
+              <a:ext uri="{FF2B5EF4-FFF2-40B4-BE49-F238E27FC236}">
+                <a16:creationId xmlns:a16="http://schemas.microsoft.com/office/drawing/2014/main" id="{384FAC5D-EB93-462C-9466-D8CCA64202AD}"/>
+              </a:ext>
+            </a:extLst>
+          </p:cNvPr>
+          <p:cNvPicPr>
+            <a:picLocks noChangeAspect="1"/>
+          </p:cNvPicPr>
+          <p:nvPr userDrawn="1"/>
+        </p:nvPicPr>
+        <p:blipFill>
+          <a:blip r:embed="rId13"/>
+          <a:stretch>
+            <a:fillRect/>
+          </a:stretch>
+        </p:blipFill>
+        <p:spPr>
+          <a:xfrm>
+            <a:off x="2681287" y="6291262"/>
+            <a:ext cx="6829425" cy="495300"/>
+          </a:xfrm>
+          <a:prstGeom prst="rect">
+            <a:avLst/>
+          </a:prstGeom>
+        </p:spPr>
+      </p:pic>
     </p:spTree>
     <p:extLst>
       <p:ext uri="{BB962C8B-B14F-4D97-AF65-F5344CB8AC3E}">
@@ -3936,9 +4280,9 @@
           <a:solidFill>
             <a:schemeClr val="tx1"/>
           </a:solidFill>
-          <a:latin typeface="+mj-lt"/>
+          <a:latin typeface="Dubai" panose="020B0503030403030204" pitchFamily="34" charset="-78"/>
           <a:ea typeface="+mj-ea"/>
-          <a:cs typeface="+mj-cs"/>
+          <a:cs typeface="Dubai" panose="020B0503030403030204" pitchFamily="34" charset="-78"/>
         </a:defRPr>
       </a:lvl1pPr>
     </p:titleStyle>
@@ -3956,9 +4300,9 @@
           <a:solidFill>
             <a:schemeClr val="tx1"/>
           </a:solidFill>
-          <a:latin typeface="+mn-lt"/>
+          <a:latin typeface="Dubai" panose="020B0503030403030204" pitchFamily="34" charset="-78"/>
           <a:ea typeface="+mn-ea"/>
-          <a:cs typeface="+mn-cs"/>
+          <a:cs typeface="Dubai" panose="020B0503030403030204" pitchFamily="34" charset="-78"/>
         </a:defRPr>
       </a:lvl1pPr>
       <a:lvl2pPr marL="685800" indent="-228600" algn="l" defTabSz="914400" rtl="0" eaLnBrk="1" latinLnBrk="0" hangingPunct="1">
@@ -3974,9 +4318,9 @@
           <a:solidFill>
             <a:schemeClr val="tx1"/>
           </a:solidFill>
-          <a:latin typeface="+mn-lt"/>
+          <a:latin typeface="Dubai" panose="020B0503030403030204" pitchFamily="34" charset="-78"/>
           <a:ea typeface="+mn-ea"/>
-          <a:cs typeface="+mn-cs"/>
+          <a:cs typeface="Dubai" panose="020B0503030403030204" pitchFamily="34" charset="-78"/>
         </a:defRPr>
       </a:lvl2pPr>
       <a:lvl3pPr marL="1143000" indent="-228600" algn="l" defTabSz="914400" rtl="0" eaLnBrk="1" latinLnBrk="0" hangingPunct="1">
@@ -3992,9 +4336,9 @@
           <a:solidFill>
             <a:schemeClr val="tx1"/>
           </a:solidFill>
-          <a:latin typeface="+mn-lt"/>
+          <a:latin typeface="Dubai" panose="020B0503030403030204" pitchFamily="34" charset="-78"/>
           <a:ea typeface="+mn-ea"/>
-          <a:cs typeface="+mn-cs"/>
+          <a:cs typeface="Dubai" panose="020B0503030403030204" pitchFamily="34" charset="-78"/>
         </a:defRPr>
       </a:lvl3pPr>
       <a:lvl4pPr marL="1600200" indent="-228600" algn="l" defTabSz="914400" rtl="0" eaLnBrk="1" latinLnBrk="0" hangingPunct="1">
@@ -4010,9 +4354,9 @@
           <a:solidFill>
             <a:schemeClr val="tx1"/>
           </a:solidFill>
-          <a:latin typeface="+mn-lt"/>
+          <a:latin typeface="Dubai" panose="020B0503030403030204" pitchFamily="34" charset="-78"/>
           <a:ea typeface="+mn-ea"/>
-          <a:cs typeface="+mn-cs"/>
+          <a:cs typeface="Dubai" panose="020B0503030403030204" pitchFamily="34" charset="-78"/>
         </a:defRPr>
       </a:lvl4pPr>
       <a:lvl5pPr marL="2057400" indent="-228600" algn="l" defTabSz="914400" rtl="0" eaLnBrk="1" latinLnBrk="0" hangingPunct="1">
@@ -4028,9 +4372,9 @@
           <a:solidFill>
             <a:schemeClr val="tx1"/>
           </a:solidFill>
-          <a:latin typeface="+mn-lt"/>
+          <a:latin typeface="Dubai" panose="020B0503030403030204" pitchFamily="34" charset="-78"/>
           <a:ea typeface="+mn-ea"/>
-          <a:cs typeface="+mn-cs"/>
+          <a:cs typeface="Dubai" panose="020B0503030403030204" pitchFamily="34" charset="-78"/>
         </a:defRPr>
       </a:lvl5pPr>
       <a:lvl6pPr marL="2514600" indent="-228600" algn="l" defTabSz="914400" rtl="0" eaLnBrk="1" latinLnBrk="0" hangingPunct="1">
@@ -4288,22 +4632,37 @@
           <a:p>
             <a:pPr algn="l"/>
             <a:r>
-              <a:rPr lang="de-DE" sz="5400" dirty="0"/>
+              <a:rPr lang="de-DE" sz="5400" dirty="0">
+                <a:latin typeface="Dubai" panose="020B0503030403030204" pitchFamily="34" charset="-78"/>
+                <a:cs typeface="Dubai" panose="020B0503030403030204" pitchFamily="34" charset="-78"/>
+              </a:rPr>
               <a:t>Connect </a:t>
             </a:r>
             <a:r>
-              <a:rPr lang="de-DE" sz="5400" dirty="0" err="1"/>
+              <a:rPr lang="de-DE" sz="5400" dirty="0" err="1">
+                <a:latin typeface="Dubai" panose="020B0503030403030204" pitchFamily="34" charset="-78"/>
+                <a:cs typeface="Dubai" panose="020B0503030403030204" pitchFamily="34" charset="-78"/>
+              </a:rPr>
               <a:t>the</a:t>
             </a:r>
             <a:r>
-              <a:rPr lang="de-DE" sz="5400" dirty="0"/>
+              <a:rPr lang="de-DE" sz="5400" dirty="0">
+                <a:latin typeface="Dubai" panose="020B0503030403030204" pitchFamily="34" charset="-78"/>
+                <a:cs typeface="Dubai" panose="020B0503030403030204" pitchFamily="34" charset="-78"/>
+              </a:rPr>
               <a:t> </a:t>
             </a:r>
             <a:r>
-              <a:rPr lang="de-DE" sz="5400" dirty="0" err="1"/>
+              <a:rPr lang="de-DE" sz="5400" dirty="0" err="1">
+                <a:latin typeface="Dubai" panose="020B0503030403030204" pitchFamily="34" charset="-78"/>
+                <a:cs typeface="Dubai" panose="020B0503030403030204" pitchFamily="34" charset="-78"/>
+              </a:rPr>
               <a:t>Dots</a:t>
             </a:r>
-            <a:endParaRPr lang="de-DE" sz="5400" dirty="0"/>
+            <a:endParaRPr lang="de-DE" sz="5400" dirty="0">
+              <a:latin typeface="Dubai" panose="020B0503030403030204" pitchFamily="34" charset="-78"/>
+              <a:cs typeface="Dubai" panose="020B0503030403030204" pitchFamily="34" charset="-78"/>
+            </a:endParaRPr>
           </a:p>
         </p:txBody>
       </p:sp>
@@ -4338,10 +4697,16 @@
           <a:p>
             <a:pPr algn="l"/>
             <a:r>
-              <a:rPr lang="en-US" sz="2000" dirty="0"/>
+              <a:rPr lang="en-US" sz="2000" dirty="0">
+                <a:latin typeface="Dubai" panose="020B0503030403030204" pitchFamily="34" charset="-78"/>
+                <a:cs typeface="Dubai" panose="020B0503030403030204" pitchFamily="34" charset="-78"/>
+              </a:rPr>
               <a:t>News aggregation and matching engine</a:t>
             </a:r>
-            <a:endParaRPr lang="de-DE" sz="2000" dirty="0"/>
+            <a:endParaRPr lang="de-DE" sz="2000" dirty="0">
+              <a:latin typeface="Dubai" panose="020B0503030403030204" pitchFamily="34" charset="-78"/>
+              <a:cs typeface="Dubai" panose="020B0503030403030204" pitchFamily="34" charset="-78"/>
+            </a:endParaRPr>
           </a:p>
         </p:txBody>
       </p:sp>
@@ -5081,6 +5446,36 @@
           </a:p>
         </p:txBody>
       </p:sp>
+      <p:pic>
+        <p:nvPicPr>
+          <p:cNvPr id="11" name="Picture 10">
+            <a:extLst>
+              <a:ext uri="{FF2B5EF4-FFF2-40B4-BE49-F238E27FC236}">
+                <a16:creationId xmlns:a16="http://schemas.microsoft.com/office/drawing/2014/main" id="{786321D3-F807-4AF4-B8E4-D89C53703F7C}"/>
+              </a:ext>
+            </a:extLst>
+          </p:cNvPr>
+          <p:cNvPicPr>
+            <a:picLocks noChangeAspect="1"/>
+          </p:cNvPicPr>
+          <p:nvPr/>
+        </p:nvPicPr>
+        <p:blipFill>
+          <a:blip r:embed="rId2"/>
+          <a:stretch>
+            <a:fillRect/>
+          </a:stretch>
+        </p:blipFill>
+        <p:spPr>
+          <a:xfrm>
+            <a:off x="2681287" y="6291262"/>
+            <a:ext cx="6829425" cy="495300"/>
+          </a:xfrm>
+          <a:prstGeom prst="rect">
+            <a:avLst/>
+          </a:prstGeom>
+        </p:spPr>
+      </p:pic>
     </p:spTree>
     <p:extLst>
       <p:ext uri="{BB962C8B-B14F-4D97-AF65-F5344CB8AC3E}">
@@ -5144,113 +5539,11 @@
         </p:blipFill>
         <p:spPr>
           <a:xfrm>
-            <a:off x="4021735" y="112291"/>
-            <a:ext cx="4128351" cy="6362692"/>
+            <a:off x="4021736" y="0"/>
+            <a:ext cx="3967696" cy="6115088"/>
           </a:xfrm>
         </p:spPr>
       </p:pic>
-      <p:sp>
-        <p:nvSpPr>
-          <p:cNvPr id="6" name="TextBox 5">
-            <a:extLst>
-              <a:ext uri="{FF2B5EF4-FFF2-40B4-BE49-F238E27FC236}">
-                <a16:creationId xmlns:a16="http://schemas.microsoft.com/office/drawing/2014/main" id="{264F0640-0319-446F-8F8C-7C3641092ABB}"/>
-              </a:ext>
-            </a:extLst>
-          </p:cNvPr>
-          <p:cNvSpPr txBox="1"/>
-          <p:nvPr/>
-        </p:nvSpPr>
-        <p:spPr>
-          <a:xfrm>
-            <a:off x="4021735" y="6474983"/>
-            <a:ext cx="4128351" cy="276999"/>
-          </a:xfrm>
-          <a:prstGeom prst="rect">
-            <a:avLst/>
-          </a:prstGeom>
-          <a:noFill/>
-        </p:spPr>
-        <p:txBody>
-          <a:bodyPr wrap="square" rtlCol="0">
-            <a:spAutoFit/>
-          </a:bodyPr>
-          <a:lstStyle/>
-          <a:p>
-            <a:r>
-              <a:rPr lang="de-DE" sz="1200" dirty="0">
-                <a:hlinkClick r:id="rId4" tooltip="https://www.flickr.com/photos/safari_vacation/6257284524"/>
-              </a:rPr>
-              <a:t>This </a:t>
-            </a:r>
-            <a:r>
-              <a:rPr lang="de-DE" sz="1200" dirty="0" err="1">
-                <a:hlinkClick r:id="rId4" tooltip="https://www.flickr.com/photos/safari_vacation/6257284524"/>
-              </a:rPr>
-              <a:t>Photo</a:t>
-            </a:r>
-            <a:r>
-              <a:rPr lang="de-DE" sz="1200" dirty="0"/>
-              <a:t> </a:t>
-            </a:r>
-            <a:r>
-              <a:rPr lang="de-DE" sz="1200" dirty="0" err="1"/>
-              <a:t>by</a:t>
-            </a:r>
-            <a:r>
-              <a:rPr lang="de-DE" sz="1200" dirty="0"/>
-              <a:t> </a:t>
-            </a:r>
-            <a:r>
-              <a:rPr lang="de-DE" sz="1200" dirty="0" err="1"/>
-              <a:t>Unknown</a:t>
-            </a:r>
-            <a:r>
-              <a:rPr lang="de-DE" sz="1200" dirty="0"/>
-              <a:t> </a:t>
-            </a:r>
-            <a:r>
-              <a:rPr lang="de-DE" sz="1200" dirty="0" err="1"/>
-              <a:t>Author</a:t>
-            </a:r>
-            <a:r>
-              <a:rPr lang="de-DE" sz="1200" dirty="0"/>
-              <a:t> </a:t>
-            </a:r>
-            <a:r>
-              <a:rPr lang="de-DE" sz="1200" dirty="0" err="1"/>
-              <a:t>is</a:t>
-            </a:r>
-            <a:r>
-              <a:rPr lang="de-DE" sz="1200" dirty="0"/>
-              <a:t> </a:t>
-            </a:r>
-            <a:r>
-              <a:rPr lang="de-DE" sz="1200" dirty="0" err="1"/>
-              <a:t>licensed</a:t>
-            </a:r>
-            <a:r>
-              <a:rPr lang="de-DE" sz="1200" dirty="0"/>
-              <a:t> </a:t>
-            </a:r>
-            <a:r>
-              <a:rPr lang="de-DE" sz="1200" dirty="0" err="1"/>
-              <a:t>under</a:t>
-            </a:r>
-            <a:r>
-              <a:rPr lang="de-DE" sz="1200" dirty="0"/>
-              <a:t> </a:t>
-            </a:r>
-            <a:r>
-              <a:rPr lang="de-DE" sz="1200" dirty="0">
-                <a:hlinkClick r:id="rId5" tooltip="https://creativecommons.org/licenses/by-nc/2.0/"/>
-              </a:rPr>
-              <a:t>CC BY-NC</a:t>
-            </a:r>
-            <a:endParaRPr lang="de-DE" sz="1200" dirty="0"/>
-          </a:p>
-        </p:txBody>
-      </p:sp>
     </p:spTree>
     <p:extLst>
       <p:ext uri="{BB962C8B-B14F-4D97-AF65-F5344CB8AC3E}">
@@ -5421,7 +5714,7 @@
         </p:nvSpPr>
         <p:spPr>
           <a:xfrm>
-            <a:off x="8941662" y="3906568"/>
+            <a:off x="9114279" y="3514504"/>
             <a:ext cx="2900696" cy="2815077"/>
           </a:xfrm>
           <a:prstGeom prst="rect">
@@ -5702,7 +5995,7 @@
         </p:nvSpPr>
         <p:spPr>
           <a:xfrm>
-            <a:off x="1354321" y="6217929"/>
+            <a:off x="3240377" y="5806361"/>
             <a:ext cx="2805383" cy="523220"/>
           </a:xfrm>
           <a:prstGeom prst="rect">
@@ -6037,7 +6330,7 @@
         </p:nvSpPr>
         <p:spPr>
           <a:xfrm>
-            <a:off x="9274341" y="4256243"/>
+            <a:off x="9446958" y="3864179"/>
             <a:ext cx="1025368" cy="408540"/>
           </a:xfrm>
           <a:prstGeom prst="rect">
@@ -6089,7 +6382,7 @@
         </p:nvSpPr>
         <p:spPr>
           <a:xfrm>
-            <a:off x="10455442" y="4250459"/>
+            <a:off x="10628059" y="3858395"/>
             <a:ext cx="1039886" cy="414324"/>
           </a:xfrm>
           <a:prstGeom prst="rect">
@@ -6141,7 +6434,7 @@
         </p:nvSpPr>
         <p:spPr>
           <a:xfrm>
-            <a:off x="9274341" y="4789611"/>
+            <a:off x="9446958" y="4397547"/>
             <a:ext cx="1025368" cy="408540"/>
           </a:xfrm>
           <a:prstGeom prst="rect">
@@ -6193,7 +6486,7 @@
         </p:nvSpPr>
         <p:spPr>
           <a:xfrm>
-            <a:off x="10455441" y="4789611"/>
+            <a:off x="10628058" y="4397547"/>
             <a:ext cx="1039887" cy="414324"/>
           </a:xfrm>
           <a:prstGeom prst="rect">
@@ -6245,7 +6538,7 @@
         </p:nvSpPr>
         <p:spPr>
           <a:xfrm>
-            <a:off x="8941662" y="3906567"/>
+            <a:off x="9114279" y="3514503"/>
             <a:ext cx="2900696" cy="207762"/>
           </a:xfrm>
           <a:prstGeom prst="rect">
@@ -6296,7 +6589,7 @@
         </p:nvSpPr>
         <p:spPr>
           <a:xfrm flipV="1">
-            <a:off x="9077733" y="5334281"/>
+            <a:off x="9250350" y="4942217"/>
             <a:ext cx="2592808" cy="45719"/>
           </a:xfrm>
           <a:prstGeom prst="rect">
@@ -6352,7 +6645,7 @@
         </p:nvSpPr>
         <p:spPr>
           <a:xfrm>
-            <a:off x="9274340" y="5516130"/>
+            <a:off x="9446957" y="5124066"/>
             <a:ext cx="1025368" cy="408540"/>
           </a:xfrm>
           <a:prstGeom prst="rect">
@@ -6404,7 +6697,7 @@
         </p:nvSpPr>
         <p:spPr>
           <a:xfrm>
-            <a:off x="10455441" y="5510346"/>
+            <a:off x="10628058" y="5118282"/>
             <a:ext cx="1039886" cy="414324"/>
           </a:xfrm>
           <a:prstGeom prst="rect">
@@ -6456,7 +6749,7 @@
         </p:nvSpPr>
         <p:spPr>
           <a:xfrm>
-            <a:off x="9274340" y="6049498"/>
+            <a:off x="9446957" y="5657434"/>
             <a:ext cx="1025368" cy="408540"/>
           </a:xfrm>
           <a:prstGeom prst="rect">
@@ -6508,7 +6801,7 @@
         </p:nvSpPr>
         <p:spPr>
           <a:xfrm>
-            <a:off x="10455440" y="6049498"/>
+            <a:off x="10628057" y="5657434"/>
             <a:ext cx="1039887" cy="414324"/>
           </a:xfrm>
           <a:prstGeom prst="rect">
@@ -6559,8 +6852,8 @@
           <p:nvPr/>
         </p:nvSpPr>
         <p:spPr>
-          <a:xfrm rot="21212095">
-            <a:off x="7562537" y="4961157"/>
+          <a:xfrm rot="20578203">
+            <a:off x="7617482" y="4750556"/>
             <a:ext cx="1178433" cy="1098378"/>
           </a:xfrm>
           <a:prstGeom prst="rightArrow">
@@ -7426,7 +7719,7 @@
         </p:nvSpPr>
         <p:spPr>
           <a:xfrm>
-            <a:off x="5045242" y="3326309"/>
+            <a:off x="5045242" y="3121351"/>
             <a:ext cx="2101516" cy="2365267"/>
           </a:xfrm>
           <a:prstGeom prst="downArrowCallout">
@@ -7528,7 +7821,7 @@
         </p:blipFill>
         <p:spPr>
           <a:xfrm>
-            <a:off x="1079333" y="1638614"/>
+            <a:off x="1079333" y="1433656"/>
             <a:ext cx="2143125" cy="2143125"/>
           </a:xfrm>
         </p:spPr>
@@ -7549,7 +7842,7 @@
             </p:nvSpPr>
             <p:spPr>
               <a:xfrm>
-                <a:off x="4227532" y="5759257"/>
+                <a:off x="4227532" y="5459703"/>
                 <a:ext cx="3736936" cy="731611"/>
               </a:xfrm>
               <a:prstGeom prst="rect">
@@ -7563,6 +7856,7 @@
               </a:bodyPr>
               <a:lstStyle/>
               <a:p>
+                <a:pPr/>
                 <a14:m>
                   <m:oMathPara xmlns:m="http://schemas.openxmlformats.org/officeDocument/2006/math">
                     <m:oMathParaPr>
@@ -7651,7 +7945,7 @@
             </p:nvSpPr>
             <p:spPr>
               <a:xfrm>
-                <a:off x="4227532" y="5759257"/>
+                <a:off x="4227532" y="5459703"/>
                 <a:ext cx="3736936" cy="731611"/>
               </a:xfrm>
               <a:prstGeom prst="rect">
@@ -7707,7 +8001,7 @@
         </p:blipFill>
         <p:spPr>
           <a:xfrm>
-            <a:off x="9093168" y="1151152"/>
+            <a:off x="9093168" y="946194"/>
             <a:ext cx="2718994" cy="2718994"/>
           </a:xfrm>
           <a:prstGeom prst="rect">
@@ -7746,7 +8040,7 @@
         </p:blipFill>
         <p:spPr>
           <a:xfrm>
-            <a:off x="5281863" y="3310619"/>
+            <a:off x="5281863" y="3105661"/>
             <a:ext cx="1628274" cy="1628274"/>
           </a:xfrm>
           <a:prstGeom prst="rect">
@@ -7768,7 +8062,7 @@
         </p:nvSpPr>
         <p:spPr>
           <a:xfrm>
-            <a:off x="1280559" y="2682235"/>
+            <a:off x="1280559" y="2477277"/>
             <a:ext cx="4429782" cy="2085474"/>
           </a:xfrm>
           <a:prstGeom prst="arc">
@@ -7819,7 +8113,7 @@
         </p:nvSpPr>
         <p:spPr>
           <a:xfrm flipH="1">
-            <a:off x="6708431" y="2682235"/>
+            <a:off x="6708431" y="2477277"/>
             <a:ext cx="4074046" cy="2085474"/>
           </a:xfrm>
           <a:prstGeom prst="arc">
@@ -7870,7 +8164,7 @@
         </p:nvSpPr>
         <p:spPr>
           <a:xfrm rot="604452">
-            <a:off x="3485885" y="2222754"/>
+            <a:off x="3485885" y="2017796"/>
             <a:ext cx="2345770" cy="461665"/>
           </a:xfrm>
           <a:prstGeom prst="rect">
@@ -7913,7 +8207,7 @@
         </p:nvSpPr>
         <p:spPr>
           <a:xfrm rot="20622925">
-            <a:off x="6878509" y="2171610"/>
+            <a:off x="6878509" y="1966652"/>
             <a:ext cx="1907189" cy="461665"/>
           </a:xfrm>
           <a:prstGeom prst="rect">
@@ -8296,8 +8590,8 @@
         </p:blipFill>
         <p:spPr>
           <a:xfrm>
-            <a:off x="484862" y="1486247"/>
-            <a:ext cx="11222275" cy="5058931"/>
+            <a:off x="938741" y="1454716"/>
+            <a:ext cx="10314517" cy="4649719"/>
           </a:xfrm>
         </p:spPr>
       </p:pic>

</xml_diff>